<commit_message>
PFC duality, voltage source
Can I ask a question about, we have envelope from switching and after that absolute function on switching actually creates a fundemental? How does that happen ?
</commit_message>
<xml_diff>
--- a/Reports/WPT/Spin-off_PFC.pptx
+++ b/Reports/WPT/Spin-off_PFC.pptx
@@ -112,6 +112,11 @@
       </a:defRPr>
     </a:lvl9pPr>
   </p:defaultTextStyle>
+  <p:extLst>
+    <p:ext uri="{EFAFB233-063F-42B5-8137-9DF3F51BA10A}">
+      <p15:sldGuideLst xmlns:p15="http://schemas.microsoft.com/office/powerpoint/2012/main"/>
+    </p:ext>
+  </p:extLst>
 </p:presentation>
 </file>
 
@@ -262,7 +267,7 @@
           <a:p>
             <a:fld id="{4E6BDD70-7B7E-4C6C-AFDD-57D30FAD961F}" type="datetimeFigureOut">
               <a:rPr lang="en-US" smtClean="0"/>
-              <a:t>9/17/2020</a:t>
+              <a:t>9/21/2020</a:t>
             </a:fld>
             <a:endParaRPr lang="en-US"/>
           </a:p>
@@ -460,7 +465,7 @@
           <a:p>
             <a:fld id="{4E6BDD70-7B7E-4C6C-AFDD-57D30FAD961F}" type="datetimeFigureOut">
               <a:rPr lang="en-US" smtClean="0"/>
-              <a:t>9/17/2020</a:t>
+              <a:t>9/21/2020</a:t>
             </a:fld>
             <a:endParaRPr lang="en-US"/>
           </a:p>
@@ -668,7 +673,7 @@
           <a:p>
             <a:fld id="{4E6BDD70-7B7E-4C6C-AFDD-57D30FAD961F}" type="datetimeFigureOut">
               <a:rPr lang="en-US" smtClean="0"/>
-              <a:t>9/17/2020</a:t>
+              <a:t>9/21/2020</a:t>
             </a:fld>
             <a:endParaRPr lang="en-US"/>
           </a:p>
@@ -866,7 +871,7 @@
           <a:p>
             <a:fld id="{4E6BDD70-7B7E-4C6C-AFDD-57D30FAD961F}" type="datetimeFigureOut">
               <a:rPr lang="en-US" smtClean="0"/>
-              <a:t>9/17/2020</a:t>
+              <a:t>9/21/2020</a:t>
             </a:fld>
             <a:endParaRPr lang="en-US"/>
           </a:p>
@@ -1141,7 +1146,7 @@
           <a:p>
             <a:fld id="{4E6BDD70-7B7E-4C6C-AFDD-57D30FAD961F}" type="datetimeFigureOut">
               <a:rPr lang="en-US" smtClean="0"/>
-              <a:t>9/17/2020</a:t>
+              <a:t>9/21/2020</a:t>
             </a:fld>
             <a:endParaRPr lang="en-US"/>
           </a:p>
@@ -1406,7 +1411,7 @@
           <a:p>
             <a:fld id="{4E6BDD70-7B7E-4C6C-AFDD-57D30FAD961F}" type="datetimeFigureOut">
               <a:rPr lang="en-US" smtClean="0"/>
-              <a:t>9/17/2020</a:t>
+              <a:t>9/21/2020</a:t>
             </a:fld>
             <a:endParaRPr lang="en-US"/>
           </a:p>
@@ -1818,7 +1823,7 @@
           <a:p>
             <a:fld id="{4E6BDD70-7B7E-4C6C-AFDD-57D30FAD961F}" type="datetimeFigureOut">
               <a:rPr lang="en-US" smtClean="0"/>
-              <a:t>9/17/2020</a:t>
+              <a:t>9/21/2020</a:t>
             </a:fld>
             <a:endParaRPr lang="en-US"/>
           </a:p>
@@ -1959,7 +1964,7 @@
           <a:p>
             <a:fld id="{4E6BDD70-7B7E-4C6C-AFDD-57D30FAD961F}" type="datetimeFigureOut">
               <a:rPr lang="en-US" smtClean="0"/>
-              <a:t>9/17/2020</a:t>
+              <a:t>9/21/2020</a:t>
             </a:fld>
             <a:endParaRPr lang="en-US"/>
           </a:p>
@@ -2072,7 +2077,7 @@
           <a:p>
             <a:fld id="{4E6BDD70-7B7E-4C6C-AFDD-57D30FAD961F}" type="datetimeFigureOut">
               <a:rPr lang="en-US" smtClean="0"/>
-              <a:t>9/17/2020</a:t>
+              <a:t>9/21/2020</a:t>
             </a:fld>
             <a:endParaRPr lang="en-US"/>
           </a:p>
@@ -2383,7 +2388,7 @@
           <a:p>
             <a:fld id="{4E6BDD70-7B7E-4C6C-AFDD-57D30FAD961F}" type="datetimeFigureOut">
               <a:rPr lang="en-US" smtClean="0"/>
-              <a:t>9/17/2020</a:t>
+              <a:t>9/21/2020</a:t>
             </a:fld>
             <a:endParaRPr lang="en-US"/>
           </a:p>
@@ -2671,7 +2676,7 @@
           <a:p>
             <a:fld id="{4E6BDD70-7B7E-4C6C-AFDD-57D30FAD961F}" type="datetimeFigureOut">
               <a:rPr lang="en-US" smtClean="0"/>
-              <a:t>9/17/2020</a:t>
+              <a:t>9/21/2020</a:t>
             </a:fld>
             <a:endParaRPr lang="en-US"/>
           </a:p>
@@ -2912,7 +2917,7 @@
           <a:p>
             <a:fld id="{4E6BDD70-7B7E-4C6C-AFDD-57D30FAD961F}" type="datetimeFigureOut">
               <a:rPr lang="en-US" smtClean="0"/>
-              <a:t>9/17/2020</a:t>
+              <a:t>9/21/2020</a:t>
             </a:fld>
             <a:endParaRPr lang="en-US"/>
           </a:p>
@@ -3916,7 +3921,7 @@
         </p:blipFill>
         <p:spPr>
           <a:xfrm>
-            <a:off x="1898760" y="1568668"/>
+            <a:off x="1712016" y="1691017"/>
             <a:ext cx="8611585" cy="4305793"/>
           </a:xfrm>
           <a:prstGeom prst="rect">
@@ -4443,8 +4448,8 @@
           <a:chExt cx="0" cy="0"/>
         </a:xfrm>
       </p:grpSpPr>
-      <mc:AlternateContent xmlns:mc="http://schemas.openxmlformats.org/markup-compatibility/2006">
-        <mc:Choice xmlns:a14="http://schemas.microsoft.com/office/drawing/2010/main" Requires="a14">
+      <mc:AlternateContent xmlns:mc="http://schemas.openxmlformats.org/markup-compatibility/2006" xmlns:a14="http://schemas.microsoft.com/office/drawing/2010/main">
+        <mc:Choice Requires="a14">
           <p:sp>
             <p:nvSpPr>
               <p:cNvPr id="9" name="TextBox 8">
@@ -4459,7 +4464,7 @@
             </p:nvSpPr>
             <p:spPr>
               <a:xfrm>
-                <a:off x="5430932" y="508000"/>
+                <a:off x="4653333" y="530014"/>
                 <a:ext cx="2981547" cy="276999"/>
               </a:xfrm>
               <a:prstGeom prst="rect">
@@ -4574,7 +4579,7 @@
             </p:txBody>
           </p:sp>
         </mc:Choice>
-        <mc:Fallback>
+        <mc:Fallback xmlns="">
           <p:sp>
             <p:nvSpPr>
               <p:cNvPr id="9" name="TextBox 8">
@@ -4591,7 +4596,7 @@
             </p:nvSpPr>
             <p:spPr>
               <a:xfrm>
-                <a:off x="5430932" y="508000"/>
+                <a:off x="4653333" y="530014"/>
                 <a:ext cx="2981547" cy="276999"/>
               </a:xfrm>
               <a:prstGeom prst="rect">
@@ -4600,7 +4605,7 @@
               <a:blipFill>
                 <a:blip r:embed="rId2"/>
                 <a:stretch>
-                  <a:fillRect l="-2863" t="-28261" b="-50000"/>
+                  <a:fillRect l="-2658" t="-28889" b="-51111"/>
                 </a:stretch>
               </a:blipFill>
             </p:spPr>
@@ -4649,8 +4654,8 @@
           </a:prstGeom>
         </p:spPr>
       </p:pic>
-      <mc:AlternateContent xmlns:mc="http://schemas.openxmlformats.org/markup-compatibility/2006">
-        <mc:Choice xmlns:a14="http://schemas.microsoft.com/office/drawing/2010/main" Requires="a14">
+      <mc:AlternateContent xmlns:mc="http://schemas.openxmlformats.org/markup-compatibility/2006" xmlns:a14="http://schemas.microsoft.com/office/drawing/2010/main">
+        <mc:Choice Requires="a14">
           <p:sp>
             <p:nvSpPr>
               <p:cNvPr id="12" name="TextBox 11">
@@ -4665,7 +4670,7 @@
             </p:nvSpPr>
             <p:spPr>
               <a:xfrm>
-                <a:off x="4679092" y="3649980"/>
+                <a:off x="4653334" y="3720814"/>
                 <a:ext cx="2981547" cy="276999"/>
               </a:xfrm>
               <a:prstGeom prst="rect">
@@ -4780,7 +4785,7 @@
             </p:txBody>
           </p:sp>
         </mc:Choice>
-        <mc:Fallback>
+        <mc:Fallback xmlns="">
           <p:sp>
             <p:nvSpPr>
               <p:cNvPr id="12" name="TextBox 11">
@@ -4797,7 +4802,7 @@
             </p:nvSpPr>
             <p:spPr>
               <a:xfrm>
-                <a:off x="4679092" y="3649980"/>
+                <a:off x="4653334" y="3720814"/>
                 <a:ext cx="2981547" cy="276999"/>
               </a:xfrm>
               <a:prstGeom prst="rect">
@@ -4806,7 +4811,7 @@
               <a:blipFill>
                 <a:blip r:embed="rId4"/>
                 <a:stretch>
-                  <a:fillRect l="-2863" t="-28889" b="-51111"/>
+                  <a:fillRect l="-2658" t="-28261" b="-50000"/>
                 </a:stretch>
               </a:blipFill>
             </p:spPr>
@@ -4847,8 +4852,38 @@
         </p:blipFill>
         <p:spPr>
           <a:xfrm>
-            <a:off x="2989896" y="4147959"/>
+            <a:off x="3047851" y="4064246"/>
             <a:ext cx="5422583" cy="2629347"/>
+          </a:xfrm>
+          <a:prstGeom prst="rect">
+            <a:avLst/>
+          </a:prstGeom>
+        </p:spPr>
+      </p:pic>
+      <p:pic>
+        <p:nvPicPr>
+          <p:cNvPr id="6" name="Picture 5">
+            <a:extLst>
+              <a:ext uri="{FF2B5EF4-FFF2-40B4-BE49-F238E27FC236}">
+                <a16:creationId xmlns:a16="http://schemas.microsoft.com/office/drawing/2014/main" id="{50A1B984-A63D-462D-B823-89A1843F1233}"/>
+              </a:ext>
+            </a:extLst>
+          </p:cNvPr>
+          <p:cNvPicPr>
+            <a:picLocks noChangeAspect="1"/>
+          </p:cNvPicPr>
+          <p:nvPr/>
+        </p:nvPicPr>
+        <p:blipFill>
+          <a:blip r:embed="rId6"/>
+          <a:stretch>
+            <a:fillRect/>
+          </a:stretch>
+        </p:blipFill>
+        <p:spPr>
+          <a:xfrm>
+            <a:off x="9096333" y="1435466"/>
+            <a:ext cx="2743200" cy="3114675"/>
           </a:xfrm>
           <a:prstGeom prst="rect">
             <a:avLst/>
@@ -4885,8 +4920,8 @@
           <a:chExt cx="0" cy="0"/>
         </a:xfrm>
       </p:grpSpPr>
-      <mc:AlternateContent xmlns:mc="http://schemas.openxmlformats.org/markup-compatibility/2006">
-        <mc:Choice xmlns:a14="http://schemas.microsoft.com/office/drawing/2010/main" Requires="a14">
+      <mc:AlternateContent xmlns:mc="http://schemas.openxmlformats.org/markup-compatibility/2006" xmlns:a14="http://schemas.microsoft.com/office/drawing/2010/main">
+        <mc:Choice Requires="a14">
           <p:sp>
             <p:nvSpPr>
               <p:cNvPr id="9" name="TextBox 8">
@@ -5016,7 +5051,7 @@
             </p:txBody>
           </p:sp>
         </mc:Choice>
-        <mc:Fallback>
+        <mc:Fallback xmlns="">
           <p:sp>
             <p:nvSpPr>
               <p:cNvPr id="9" name="TextBox 8">
@@ -5061,8 +5096,8 @@
           </p:sp>
         </mc:Fallback>
       </mc:AlternateContent>
-      <mc:AlternateContent xmlns:mc="http://schemas.openxmlformats.org/markup-compatibility/2006">
-        <mc:Choice xmlns:a14="http://schemas.microsoft.com/office/drawing/2010/main" Requires="a14">
+      <mc:AlternateContent xmlns:mc="http://schemas.openxmlformats.org/markup-compatibility/2006" xmlns:a14="http://schemas.microsoft.com/office/drawing/2010/main">
+        <mc:Choice Requires="a14">
           <p:sp>
             <p:nvSpPr>
               <p:cNvPr id="12" name="TextBox 11">
@@ -5192,7 +5227,7 @@
             </p:txBody>
           </p:sp>
         </mc:Choice>
-        <mc:Fallback>
+        <mc:Fallback xmlns="">
           <p:sp>
             <p:nvSpPr>
               <p:cNvPr id="12" name="TextBox 11">

</xml_diff>

<commit_message>
PFC simulation models are created in simulink
</commit_message>
<xml_diff>
--- a/Reports/WPT/Spin-off_PFC.pptx
+++ b/Reports/WPT/Spin-off_PFC.pptx
@@ -267,7 +267,7 @@
           <a:p>
             <a:fld id="{4E6BDD70-7B7E-4C6C-AFDD-57D30FAD961F}" type="datetimeFigureOut">
               <a:rPr lang="en-US" smtClean="0"/>
-              <a:t>9/21/2020</a:t>
+              <a:t>9/24/2020</a:t>
             </a:fld>
             <a:endParaRPr lang="en-US"/>
           </a:p>
@@ -465,7 +465,7 @@
           <a:p>
             <a:fld id="{4E6BDD70-7B7E-4C6C-AFDD-57D30FAD961F}" type="datetimeFigureOut">
               <a:rPr lang="en-US" smtClean="0"/>
-              <a:t>9/21/2020</a:t>
+              <a:t>9/24/2020</a:t>
             </a:fld>
             <a:endParaRPr lang="en-US"/>
           </a:p>
@@ -673,7 +673,7 @@
           <a:p>
             <a:fld id="{4E6BDD70-7B7E-4C6C-AFDD-57D30FAD961F}" type="datetimeFigureOut">
               <a:rPr lang="en-US" smtClean="0"/>
-              <a:t>9/21/2020</a:t>
+              <a:t>9/24/2020</a:t>
             </a:fld>
             <a:endParaRPr lang="en-US"/>
           </a:p>
@@ -871,7 +871,7 @@
           <a:p>
             <a:fld id="{4E6BDD70-7B7E-4C6C-AFDD-57D30FAD961F}" type="datetimeFigureOut">
               <a:rPr lang="en-US" smtClean="0"/>
-              <a:t>9/21/2020</a:t>
+              <a:t>9/24/2020</a:t>
             </a:fld>
             <a:endParaRPr lang="en-US"/>
           </a:p>
@@ -1146,7 +1146,7 @@
           <a:p>
             <a:fld id="{4E6BDD70-7B7E-4C6C-AFDD-57D30FAD961F}" type="datetimeFigureOut">
               <a:rPr lang="en-US" smtClean="0"/>
-              <a:t>9/21/2020</a:t>
+              <a:t>9/24/2020</a:t>
             </a:fld>
             <a:endParaRPr lang="en-US"/>
           </a:p>
@@ -1411,7 +1411,7 @@
           <a:p>
             <a:fld id="{4E6BDD70-7B7E-4C6C-AFDD-57D30FAD961F}" type="datetimeFigureOut">
               <a:rPr lang="en-US" smtClean="0"/>
-              <a:t>9/21/2020</a:t>
+              <a:t>9/24/2020</a:t>
             </a:fld>
             <a:endParaRPr lang="en-US"/>
           </a:p>
@@ -1823,7 +1823,7 @@
           <a:p>
             <a:fld id="{4E6BDD70-7B7E-4C6C-AFDD-57D30FAD961F}" type="datetimeFigureOut">
               <a:rPr lang="en-US" smtClean="0"/>
-              <a:t>9/21/2020</a:t>
+              <a:t>9/24/2020</a:t>
             </a:fld>
             <a:endParaRPr lang="en-US"/>
           </a:p>
@@ -1964,7 +1964,7 @@
           <a:p>
             <a:fld id="{4E6BDD70-7B7E-4C6C-AFDD-57D30FAD961F}" type="datetimeFigureOut">
               <a:rPr lang="en-US" smtClean="0"/>
-              <a:t>9/21/2020</a:t>
+              <a:t>9/24/2020</a:t>
             </a:fld>
             <a:endParaRPr lang="en-US"/>
           </a:p>
@@ -2077,7 +2077,7 @@
           <a:p>
             <a:fld id="{4E6BDD70-7B7E-4C6C-AFDD-57D30FAD961F}" type="datetimeFigureOut">
               <a:rPr lang="en-US" smtClean="0"/>
-              <a:t>9/21/2020</a:t>
+              <a:t>9/24/2020</a:t>
             </a:fld>
             <a:endParaRPr lang="en-US"/>
           </a:p>
@@ -2388,7 +2388,7 @@
           <a:p>
             <a:fld id="{4E6BDD70-7B7E-4C6C-AFDD-57D30FAD961F}" type="datetimeFigureOut">
               <a:rPr lang="en-US" smtClean="0"/>
-              <a:t>9/21/2020</a:t>
+              <a:t>9/24/2020</a:t>
             </a:fld>
             <a:endParaRPr lang="en-US"/>
           </a:p>
@@ -2676,7 +2676,7 @@
           <a:p>
             <a:fld id="{4E6BDD70-7B7E-4C6C-AFDD-57D30FAD961F}" type="datetimeFigureOut">
               <a:rPr lang="en-US" smtClean="0"/>
-              <a:t>9/21/2020</a:t>
+              <a:t>9/24/2020</a:t>
             </a:fld>
             <a:endParaRPr lang="en-US"/>
           </a:p>
@@ -2917,7 +2917,7 @@
           <a:p>
             <a:fld id="{4E6BDD70-7B7E-4C6C-AFDD-57D30FAD961F}" type="datetimeFigureOut">
               <a:rPr lang="en-US" smtClean="0"/>
-              <a:t>9/21/2020</a:t>
+              <a:t>9/24/2020</a:t>
             </a:fld>
             <a:endParaRPr lang="en-US"/>
           </a:p>

</xml_diff>